<commit_message>
PMP done. Revert here if sims fail.
</commit_message>
<xml_diff>
--- a/analysis/submitted_analyses/individual_estimates.pptx
+++ b/analysis/submitted_analyses/individual_estimates.pptx
@@ -2,12 +2,12 @@
 <file path=ppt/presentation.xml><?xml version="1.0" encoding="utf-8"?>
 <p:presentation xmlns:a="http://schemas.openxmlformats.org/drawingml/2006/main" xmlns:r="http://schemas.openxmlformats.org/officeDocument/2006/relationships" xmlns:p="http://schemas.openxmlformats.org/presentationml/2006/main" saveSubsetFonts="1" autoCompressPictures="0">
   <p:sldMasterIdLst>
-    <p:sldMasterId id="2147483708" r:id="rId1"/>
+    <p:sldMasterId id="2147483744" r:id="rId1"/>
   </p:sldMasterIdLst>
   <p:sldIdLst>
     <p:sldId id="257" r:id="rId2"/>
   </p:sldIdLst>
-  <p:sldSz cx="11430000" cy="3886200"/>
+  <p:sldSz cx="11247438" cy="5761038"/>
   <p:notesSz cx="6858000" cy="9144000"/>
   <p:defaultTextStyle>
     <a:defPPr>
@@ -141,15 +141,15 @@
         </p:nvSpPr>
         <p:spPr>
           <a:xfrm>
-            <a:off x="1428750" y="636006"/>
-            <a:ext cx="8572500" cy="1352973"/>
+            <a:off x="1405930" y="942837"/>
+            <a:ext cx="8435579" cy="2005695"/>
           </a:xfrm>
         </p:spPr>
         <p:txBody>
           <a:bodyPr anchor="b"/>
           <a:lstStyle>
             <a:lvl1pPr algn="ctr">
-              <a:defRPr sz="3400"/>
+              <a:defRPr sz="5040"/>
             </a:lvl1pPr>
           </a:lstStyle>
           <a:p>
@@ -173,8 +173,8 @@
         </p:nvSpPr>
         <p:spPr>
           <a:xfrm>
-            <a:off x="1428750" y="2041155"/>
-            <a:ext cx="8572500" cy="938265"/>
+            <a:off x="1405930" y="3025879"/>
+            <a:ext cx="8435579" cy="1390917"/>
           </a:xfrm>
         </p:spPr>
         <p:txBody>
@@ -182,39 +182,39 @@
           <a:lstStyle>
             <a:lvl1pPr marL="0" indent="0" algn="ctr">
               <a:buNone/>
-              <a:defRPr sz="1360"/>
+              <a:defRPr sz="2016"/>
             </a:lvl1pPr>
-            <a:lvl2pPr marL="259095" indent="0" algn="ctr">
-              <a:buNone/>
-              <a:defRPr sz="1133"/>
+            <a:lvl2pPr marL="384048" indent="0" algn="ctr">
+              <a:buNone/>
+              <a:defRPr sz="1680"/>
             </a:lvl2pPr>
-            <a:lvl3pPr marL="518190" indent="0" algn="ctr">
-              <a:buNone/>
-              <a:defRPr sz="1020"/>
+            <a:lvl3pPr marL="768096" indent="0" algn="ctr">
+              <a:buNone/>
+              <a:defRPr sz="1512"/>
             </a:lvl3pPr>
-            <a:lvl4pPr marL="777286" indent="0" algn="ctr">
-              <a:buNone/>
-              <a:defRPr sz="907"/>
+            <a:lvl4pPr marL="1152144" indent="0" algn="ctr">
+              <a:buNone/>
+              <a:defRPr sz="1344"/>
             </a:lvl4pPr>
-            <a:lvl5pPr marL="1036381" indent="0" algn="ctr">
-              <a:buNone/>
-              <a:defRPr sz="907"/>
+            <a:lvl5pPr marL="1536192" indent="0" algn="ctr">
+              <a:buNone/>
+              <a:defRPr sz="1344"/>
             </a:lvl5pPr>
-            <a:lvl6pPr marL="1295476" indent="0" algn="ctr">
-              <a:buNone/>
-              <a:defRPr sz="907"/>
+            <a:lvl6pPr marL="1920240" indent="0" algn="ctr">
+              <a:buNone/>
+              <a:defRPr sz="1344"/>
             </a:lvl6pPr>
-            <a:lvl7pPr marL="1554571" indent="0" algn="ctr">
-              <a:buNone/>
-              <a:defRPr sz="907"/>
+            <a:lvl7pPr marL="2304288" indent="0" algn="ctr">
+              <a:buNone/>
+              <a:defRPr sz="1344"/>
             </a:lvl7pPr>
-            <a:lvl8pPr marL="1813667" indent="0" algn="ctr">
-              <a:buNone/>
-              <a:defRPr sz="907"/>
+            <a:lvl8pPr marL="2688336" indent="0" algn="ctr">
+              <a:buNone/>
+              <a:defRPr sz="1344"/>
             </a:lvl8pPr>
-            <a:lvl9pPr marL="2072762" indent="0" algn="ctr">
-              <a:buNone/>
-              <a:defRPr sz="907"/>
+            <a:lvl9pPr marL="3072384" indent="0" algn="ctr">
+              <a:buNone/>
+              <a:defRPr sz="1344"/>
             </a:lvl9pPr>
           </a:lstStyle>
           <a:p>
@@ -243,7 +243,7 @@
           <a:p>
             <a:fld id="{CFC60B5F-2253-DF41-8690-61B53F1555CE}" type="datetimeFigureOut">
               <a:rPr lang="en-US" smtClean="0"/>
-              <a:t>2/5/24</a:t>
+              <a:t>2/17/24</a:t>
             </a:fld>
             <a:endParaRPr lang="en-US"/>
           </a:p>
@@ -294,7 +294,7 @@
     </p:spTree>
     <p:extLst>
       <p:ext uri="{BB962C8B-B14F-4D97-AF65-F5344CB8AC3E}">
-        <p14:creationId xmlns:p14="http://schemas.microsoft.com/office/powerpoint/2010/main" val="746920843"/>
+        <p14:creationId xmlns:p14="http://schemas.microsoft.com/office/powerpoint/2010/main" val="2406242354"/>
       </p:ext>
     </p:extLst>
   </p:cSld>
@@ -413,7 +413,7 @@
           <a:p>
             <a:fld id="{CFC60B5F-2253-DF41-8690-61B53F1555CE}" type="datetimeFigureOut">
               <a:rPr lang="en-US" smtClean="0"/>
-              <a:t>2/5/24</a:t>
+              <a:t>2/17/24</a:t>
             </a:fld>
             <a:endParaRPr lang="en-US"/>
           </a:p>
@@ -464,7 +464,7 @@
     </p:spTree>
     <p:extLst>
       <p:ext uri="{BB962C8B-B14F-4D97-AF65-F5344CB8AC3E}">
-        <p14:creationId xmlns:p14="http://schemas.microsoft.com/office/powerpoint/2010/main" val="3195974522"/>
+        <p14:creationId xmlns:p14="http://schemas.microsoft.com/office/powerpoint/2010/main" val="1220414227"/>
       </p:ext>
     </p:extLst>
   </p:cSld>
@@ -503,8 +503,8 @@
         </p:nvSpPr>
         <p:spPr>
           <a:xfrm>
-            <a:off x="8179594" y="206904"/>
-            <a:ext cx="2464594" cy="3293375"/>
+            <a:off x="8048948" y="306722"/>
+            <a:ext cx="2425229" cy="4882213"/>
           </a:xfrm>
         </p:spPr>
         <p:txBody>
@@ -531,8 +531,8 @@
         </p:nvSpPr>
         <p:spPr>
           <a:xfrm>
-            <a:off x="785813" y="206904"/>
-            <a:ext cx="7250906" cy="3293375"/>
+            <a:off x="773262" y="306722"/>
+            <a:ext cx="7135093" cy="4882213"/>
           </a:xfrm>
         </p:spPr>
         <p:txBody>
@@ -593,7 +593,7 @@
           <a:p>
             <a:fld id="{CFC60B5F-2253-DF41-8690-61B53F1555CE}" type="datetimeFigureOut">
               <a:rPr lang="en-US" smtClean="0"/>
-              <a:t>2/5/24</a:t>
+              <a:t>2/17/24</a:t>
             </a:fld>
             <a:endParaRPr lang="en-US"/>
           </a:p>
@@ -644,7 +644,7 @@
     </p:spTree>
     <p:extLst>
       <p:ext uri="{BB962C8B-B14F-4D97-AF65-F5344CB8AC3E}">
-        <p14:creationId xmlns:p14="http://schemas.microsoft.com/office/powerpoint/2010/main" val="1313554477"/>
+        <p14:creationId xmlns:p14="http://schemas.microsoft.com/office/powerpoint/2010/main" val="3469336412"/>
       </p:ext>
     </p:extLst>
   </p:cSld>
@@ -763,7 +763,7 @@
           <a:p>
             <a:fld id="{CFC60B5F-2253-DF41-8690-61B53F1555CE}" type="datetimeFigureOut">
               <a:rPr lang="en-US" smtClean="0"/>
-              <a:t>2/5/24</a:t>
+              <a:t>2/17/24</a:t>
             </a:fld>
             <a:endParaRPr lang="en-US"/>
           </a:p>
@@ -814,7 +814,7 @@
     </p:spTree>
     <p:extLst>
       <p:ext uri="{BB962C8B-B14F-4D97-AF65-F5344CB8AC3E}">
-        <p14:creationId xmlns:p14="http://schemas.microsoft.com/office/powerpoint/2010/main" val="621274122"/>
+        <p14:creationId xmlns:p14="http://schemas.microsoft.com/office/powerpoint/2010/main" val="1118506799"/>
       </p:ext>
     </p:extLst>
   </p:cSld>
@@ -853,15 +853,15 @@
         </p:nvSpPr>
         <p:spPr>
           <a:xfrm>
-            <a:off x="779859" y="968852"/>
-            <a:ext cx="9858375" cy="1616551"/>
+            <a:off x="767403" y="1436260"/>
+            <a:ext cx="9700915" cy="2396431"/>
           </a:xfrm>
         </p:spPr>
         <p:txBody>
           <a:bodyPr anchor="b"/>
           <a:lstStyle>
             <a:lvl1pPr>
-              <a:defRPr sz="3400"/>
+              <a:defRPr sz="5040"/>
             </a:lvl1pPr>
           </a:lstStyle>
           <a:p>
@@ -885,8 +885,8 @@
         </p:nvSpPr>
         <p:spPr>
           <a:xfrm>
-            <a:off x="779859" y="2600696"/>
-            <a:ext cx="9858375" cy="850106"/>
+            <a:off x="767403" y="3855362"/>
+            <a:ext cx="9700915" cy="1260227"/>
           </a:xfrm>
         </p:spPr>
         <p:txBody>
@@ -894,7 +894,7 @@
           <a:lstStyle>
             <a:lvl1pPr marL="0" indent="0">
               <a:buNone/>
-              <a:defRPr sz="1360">
+              <a:defRPr sz="2016">
                 <a:solidFill>
                   <a:schemeClr val="tx1">
                     <a:tint val="75000"/>
@@ -902,9 +902,9 @@
                 </a:solidFill>
               </a:defRPr>
             </a:lvl1pPr>
-            <a:lvl2pPr marL="259095" indent="0">
-              <a:buNone/>
-              <a:defRPr sz="1133">
+            <a:lvl2pPr marL="384048" indent="0">
+              <a:buNone/>
+              <a:defRPr sz="1680">
                 <a:solidFill>
                   <a:schemeClr val="tx1">
                     <a:tint val="75000"/>
@@ -912,9 +912,9 @@
                 </a:solidFill>
               </a:defRPr>
             </a:lvl2pPr>
-            <a:lvl3pPr marL="518190" indent="0">
-              <a:buNone/>
-              <a:defRPr sz="1020">
+            <a:lvl3pPr marL="768096" indent="0">
+              <a:buNone/>
+              <a:defRPr sz="1512">
                 <a:solidFill>
                   <a:schemeClr val="tx1">
                     <a:tint val="75000"/>
@@ -922,9 +922,9 @@
                 </a:solidFill>
               </a:defRPr>
             </a:lvl3pPr>
-            <a:lvl4pPr marL="777286" indent="0">
-              <a:buNone/>
-              <a:defRPr sz="907">
+            <a:lvl4pPr marL="1152144" indent="0">
+              <a:buNone/>
+              <a:defRPr sz="1344">
                 <a:solidFill>
                   <a:schemeClr val="tx1">
                     <a:tint val="75000"/>
@@ -932,9 +932,9 @@
                 </a:solidFill>
               </a:defRPr>
             </a:lvl4pPr>
-            <a:lvl5pPr marL="1036381" indent="0">
-              <a:buNone/>
-              <a:defRPr sz="907">
+            <a:lvl5pPr marL="1536192" indent="0">
+              <a:buNone/>
+              <a:defRPr sz="1344">
                 <a:solidFill>
                   <a:schemeClr val="tx1">
                     <a:tint val="75000"/>
@@ -942,9 +942,9 @@
                 </a:solidFill>
               </a:defRPr>
             </a:lvl5pPr>
-            <a:lvl6pPr marL="1295476" indent="0">
-              <a:buNone/>
-              <a:defRPr sz="907">
+            <a:lvl6pPr marL="1920240" indent="0">
+              <a:buNone/>
+              <a:defRPr sz="1344">
                 <a:solidFill>
                   <a:schemeClr val="tx1">
                     <a:tint val="75000"/>
@@ -952,9 +952,9 @@
                 </a:solidFill>
               </a:defRPr>
             </a:lvl6pPr>
-            <a:lvl7pPr marL="1554571" indent="0">
-              <a:buNone/>
-              <a:defRPr sz="907">
+            <a:lvl7pPr marL="2304288" indent="0">
+              <a:buNone/>
+              <a:defRPr sz="1344">
                 <a:solidFill>
                   <a:schemeClr val="tx1">
                     <a:tint val="75000"/>
@@ -962,9 +962,9 @@
                 </a:solidFill>
               </a:defRPr>
             </a:lvl7pPr>
-            <a:lvl8pPr marL="1813667" indent="0">
-              <a:buNone/>
-              <a:defRPr sz="907">
+            <a:lvl8pPr marL="2688336" indent="0">
+              <a:buNone/>
+              <a:defRPr sz="1344">
                 <a:solidFill>
                   <a:schemeClr val="tx1">
                     <a:tint val="75000"/>
@@ -972,9 +972,9 @@
                 </a:solidFill>
               </a:defRPr>
             </a:lvl8pPr>
-            <a:lvl9pPr marL="2072762" indent="0">
-              <a:buNone/>
-              <a:defRPr sz="907">
+            <a:lvl9pPr marL="3072384" indent="0">
+              <a:buNone/>
+              <a:defRPr sz="1344">
                 <a:solidFill>
                   <a:schemeClr val="tx1">
                     <a:tint val="75000"/>
@@ -1009,7 +1009,7 @@
           <a:p>
             <a:fld id="{CFC60B5F-2253-DF41-8690-61B53F1555CE}" type="datetimeFigureOut">
               <a:rPr lang="en-US" smtClean="0"/>
-              <a:t>2/5/24</a:t>
+              <a:t>2/17/24</a:t>
             </a:fld>
             <a:endParaRPr lang="en-US"/>
           </a:p>
@@ -1060,7 +1060,7 @@
     </p:spTree>
     <p:extLst>
       <p:ext uri="{BB962C8B-B14F-4D97-AF65-F5344CB8AC3E}">
-        <p14:creationId xmlns:p14="http://schemas.microsoft.com/office/powerpoint/2010/main" val="1067058416"/>
+        <p14:creationId xmlns:p14="http://schemas.microsoft.com/office/powerpoint/2010/main" val="358345882"/>
       </p:ext>
     </p:extLst>
   </p:cSld>
@@ -1122,8 +1122,8 @@
         </p:nvSpPr>
         <p:spPr>
           <a:xfrm>
-            <a:off x="785813" y="1034521"/>
-            <a:ext cx="4857750" cy="2465758"/>
+            <a:off x="773261" y="1533609"/>
+            <a:ext cx="4780161" cy="3655326"/>
           </a:xfrm>
         </p:spPr>
         <p:txBody>
@@ -1179,8 +1179,8 @@
         </p:nvSpPr>
         <p:spPr>
           <a:xfrm>
-            <a:off x="5786438" y="1034521"/>
-            <a:ext cx="4857750" cy="2465758"/>
+            <a:off x="5694016" y="1533609"/>
+            <a:ext cx="4780161" cy="3655326"/>
           </a:xfrm>
         </p:spPr>
         <p:txBody>
@@ -1241,7 +1241,7 @@
           <a:p>
             <a:fld id="{CFC60B5F-2253-DF41-8690-61B53F1555CE}" type="datetimeFigureOut">
               <a:rPr lang="en-US" smtClean="0"/>
-              <a:t>2/5/24</a:t>
+              <a:t>2/17/24</a:t>
             </a:fld>
             <a:endParaRPr lang="en-US"/>
           </a:p>
@@ -1292,7 +1292,7 @@
     </p:spTree>
     <p:extLst>
       <p:ext uri="{BB962C8B-B14F-4D97-AF65-F5344CB8AC3E}">
-        <p14:creationId xmlns:p14="http://schemas.microsoft.com/office/powerpoint/2010/main" val="3015880232"/>
+        <p14:creationId xmlns:p14="http://schemas.microsoft.com/office/powerpoint/2010/main" val="1312176458"/>
       </p:ext>
     </p:extLst>
   </p:cSld>
@@ -1331,8 +1331,8 @@
         </p:nvSpPr>
         <p:spPr>
           <a:xfrm>
-            <a:off x="787301" y="206905"/>
-            <a:ext cx="9858375" cy="751152"/>
+            <a:off x="774726" y="306723"/>
+            <a:ext cx="9700915" cy="1113534"/>
           </a:xfrm>
         </p:spPr>
         <p:txBody>
@@ -1359,8 +1359,8 @@
         </p:nvSpPr>
         <p:spPr>
           <a:xfrm>
-            <a:off x="787302" y="952659"/>
-            <a:ext cx="4835425" cy="466883"/>
+            <a:off x="774727" y="1412255"/>
+            <a:ext cx="4758193" cy="692124"/>
           </a:xfrm>
         </p:spPr>
         <p:txBody>
@@ -1368,39 +1368,39 @@
           <a:lstStyle>
             <a:lvl1pPr marL="0" indent="0">
               <a:buNone/>
-              <a:defRPr sz="1360" b="1"/>
+              <a:defRPr sz="2016" b="1"/>
             </a:lvl1pPr>
-            <a:lvl2pPr marL="259095" indent="0">
-              <a:buNone/>
-              <a:defRPr sz="1133" b="1"/>
+            <a:lvl2pPr marL="384048" indent="0">
+              <a:buNone/>
+              <a:defRPr sz="1680" b="1"/>
             </a:lvl2pPr>
-            <a:lvl3pPr marL="518190" indent="0">
-              <a:buNone/>
-              <a:defRPr sz="1020" b="1"/>
+            <a:lvl3pPr marL="768096" indent="0">
+              <a:buNone/>
+              <a:defRPr sz="1512" b="1"/>
             </a:lvl3pPr>
-            <a:lvl4pPr marL="777286" indent="0">
-              <a:buNone/>
-              <a:defRPr sz="907" b="1"/>
+            <a:lvl4pPr marL="1152144" indent="0">
+              <a:buNone/>
+              <a:defRPr sz="1344" b="1"/>
             </a:lvl4pPr>
-            <a:lvl5pPr marL="1036381" indent="0">
-              <a:buNone/>
-              <a:defRPr sz="907" b="1"/>
+            <a:lvl5pPr marL="1536192" indent="0">
+              <a:buNone/>
+              <a:defRPr sz="1344" b="1"/>
             </a:lvl5pPr>
-            <a:lvl6pPr marL="1295476" indent="0">
-              <a:buNone/>
-              <a:defRPr sz="907" b="1"/>
+            <a:lvl6pPr marL="1920240" indent="0">
+              <a:buNone/>
+              <a:defRPr sz="1344" b="1"/>
             </a:lvl6pPr>
-            <a:lvl7pPr marL="1554571" indent="0">
-              <a:buNone/>
-              <a:defRPr sz="907" b="1"/>
+            <a:lvl7pPr marL="2304288" indent="0">
+              <a:buNone/>
+              <a:defRPr sz="1344" b="1"/>
             </a:lvl7pPr>
-            <a:lvl8pPr marL="1813667" indent="0">
-              <a:buNone/>
-              <a:defRPr sz="907" b="1"/>
+            <a:lvl8pPr marL="2688336" indent="0">
+              <a:buNone/>
+              <a:defRPr sz="1344" b="1"/>
             </a:lvl8pPr>
-            <a:lvl9pPr marL="2072762" indent="0">
-              <a:buNone/>
-              <a:defRPr sz="907" b="1"/>
+            <a:lvl9pPr marL="3072384" indent="0">
+              <a:buNone/>
+              <a:defRPr sz="1344" b="1"/>
             </a:lvl9pPr>
           </a:lstStyle>
           <a:p>
@@ -1424,8 +1424,8 @@
         </p:nvSpPr>
         <p:spPr>
           <a:xfrm>
-            <a:off x="787302" y="1419543"/>
-            <a:ext cx="4835425" cy="2087933"/>
+            <a:off x="774727" y="2104379"/>
+            <a:ext cx="4758193" cy="3095225"/>
           </a:xfrm>
         </p:spPr>
         <p:txBody>
@@ -1481,8 +1481,8 @@
         </p:nvSpPr>
         <p:spPr>
           <a:xfrm>
-            <a:off x="5786437" y="952659"/>
-            <a:ext cx="4859239" cy="466883"/>
+            <a:off x="5694016" y="1412255"/>
+            <a:ext cx="4781626" cy="692124"/>
           </a:xfrm>
         </p:spPr>
         <p:txBody>
@@ -1490,39 +1490,39 @@
           <a:lstStyle>
             <a:lvl1pPr marL="0" indent="0">
               <a:buNone/>
-              <a:defRPr sz="1360" b="1"/>
+              <a:defRPr sz="2016" b="1"/>
             </a:lvl1pPr>
-            <a:lvl2pPr marL="259095" indent="0">
-              <a:buNone/>
-              <a:defRPr sz="1133" b="1"/>
+            <a:lvl2pPr marL="384048" indent="0">
+              <a:buNone/>
+              <a:defRPr sz="1680" b="1"/>
             </a:lvl2pPr>
-            <a:lvl3pPr marL="518190" indent="0">
-              <a:buNone/>
-              <a:defRPr sz="1020" b="1"/>
+            <a:lvl3pPr marL="768096" indent="0">
+              <a:buNone/>
+              <a:defRPr sz="1512" b="1"/>
             </a:lvl3pPr>
-            <a:lvl4pPr marL="777286" indent="0">
-              <a:buNone/>
-              <a:defRPr sz="907" b="1"/>
+            <a:lvl4pPr marL="1152144" indent="0">
+              <a:buNone/>
+              <a:defRPr sz="1344" b="1"/>
             </a:lvl4pPr>
-            <a:lvl5pPr marL="1036381" indent="0">
-              <a:buNone/>
-              <a:defRPr sz="907" b="1"/>
+            <a:lvl5pPr marL="1536192" indent="0">
+              <a:buNone/>
+              <a:defRPr sz="1344" b="1"/>
             </a:lvl5pPr>
-            <a:lvl6pPr marL="1295476" indent="0">
-              <a:buNone/>
-              <a:defRPr sz="907" b="1"/>
+            <a:lvl6pPr marL="1920240" indent="0">
+              <a:buNone/>
+              <a:defRPr sz="1344" b="1"/>
             </a:lvl6pPr>
-            <a:lvl7pPr marL="1554571" indent="0">
-              <a:buNone/>
-              <a:defRPr sz="907" b="1"/>
+            <a:lvl7pPr marL="2304288" indent="0">
+              <a:buNone/>
+              <a:defRPr sz="1344" b="1"/>
             </a:lvl7pPr>
-            <a:lvl8pPr marL="1813667" indent="0">
-              <a:buNone/>
-              <a:defRPr sz="907" b="1"/>
+            <a:lvl8pPr marL="2688336" indent="0">
+              <a:buNone/>
+              <a:defRPr sz="1344" b="1"/>
             </a:lvl8pPr>
-            <a:lvl9pPr marL="2072762" indent="0">
-              <a:buNone/>
-              <a:defRPr sz="907" b="1"/>
+            <a:lvl9pPr marL="3072384" indent="0">
+              <a:buNone/>
+              <a:defRPr sz="1344" b="1"/>
             </a:lvl9pPr>
           </a:lstStyle>
           <a:p>
@@ -1546,8 +1546,8 @@
         </p:nvSpPr>
         <p:spPr>
           <a:xfrm>
-            <a:off x="5786437" y="1419543"/>
-            <a:ext cx="4859239" cy="2087933"/>
+            <a:off x="5694016" y="2104379"/>
+            <a:ext cx="4781626" cy="3095225"/>
           </a:xfrm>
         </p:spPr>
         <p:txBody>
@@ -1608,7 +1608,7 @@
           <a:p>
             <a:fld id="{CFC60B5F-2253-DF41-8690-61B53F1555CE}" type="datetimeFigureOut">
               <a:rPr lang="en-US" smtClean="0"/>
-              <a:t>2/5/24</a:t>
+              <a:t>2/17/24</a:t>
             </a:fld>
             <a:endParaRPr lang="en-US"/>
           </a:p>
@@ -1659,7 +1659,7 @@
     </p:spTree>
     <p:extLst>
       <p:ext uri="{BB962C8B-B14F-4D97-AF65-F5344CB8AC3E}">
-        <p14:creationId xmlns:p14="http://schemas.microsoft.com/office/powerpoint/2010/main" val="877700139"/>
+        <p14:creationId xmlns:p14="http://schemas.microsoft.com/office/powerpoint/2010/main" val="3975034693"/>
       </p:ext>
     </p:extLst>
   </p:cSld>
@@ -1726,7 +1726,7 @@
           <a:p>
             <a:fld id="{CFC60B5F-2253-DF41-8690-61B53F1555CE}" type="datetimeFigureOut">
               <a:rPr lang="en-US" smtClean="0"/>
-              <a:t>2/5/24</a:t>
+              <a:t>2/17/24</a:t>
             </a:fld>
             <a:endParaRPr lang="en-US"/>
           </a:p>
@@ -1777,7 +1777,7 @@
     </p:spTree>
     <p:extLst>
       <p:ext uri="{BB962C8B-B14F-4D97-AF65-F5344CB8AC3E}">
-        <p14:creationId xmlns:p14="http://schemas.microsoft.com/office/powerpoint/2010/main" val="2527958168"/>
+        <p14:creationId xmlns:p14="http://schemas.microsoft.com/office/powerpoint/2010/main" val="168306929"/>
       </p:ext>
     </p:extLst>
   </p:cSld>
@@ -1821,7 +1821,7 @@
           <a:p>
             <a:fld id="{CFC60B5F-2253-DF41-8690-61B53F1555CE}" type="datetimeFigureOut">
               <a:rPr lang="en-US" smtClean="0"/>
-              <a:t>2/5/24</a:t>
+              <a:t>2/17/24</a:t>
             </a:fld>
             <a:endParaRPr lang="en-US"/>
           </a:p>
@@ -1872,7 +1872,7 @@
     </p:spTree>
     <p:extLst>
       <p:ext uri="{BB962C8B-B14F-4D97-AF65-F5344CB8AC3E}">
-        <p14:creationId xmlns:p14="http://schemas.microsoft.com/office/powerpoint/2010/main" val="3810499976"/>
+        <p14:creationId xmlns:p14="http://schemas.microsoft.com/office/powerpoint/2010/main" val="2586412193"/>
       </p:ext>
     </p:extLst>
   </p:cSld>
@@ -1911,15 +1911,15 @@
         </p:nvSpPr>
         <p:spPr>
           <a:xfrm>
-            <a:off x="787302" y="259080"/>
-            <a:ext cx="3686472" cy="906780"/>
+            <a:off x="774727" y="384069"/>
+            <a:ext cx="3627591" cy="1344242"/>
           </a:xfrm>
         </p:spPr>
         <p:txBody>
           <a:bodyPr anchor="b"/>
           <a:lstStyle>
             <a:lvl1pPr>
-              <a:defRPr sz="1813"/>
+              <a:defRPr sz="2688"/>
             </a:lvl1pPr>
           </a:lstStyle>
           <a:p>
@@ -1943,39 +1943,39 @@
         </p:nvSpPr>
         <p:spPr>
           <a:xfrm>
-            <a:off x="4859238" y="559541"/>
-            <a:ext cx="5786438" cy="2761721"/>
+            <a:off x="4781626" y="829483"/>
+            <a:ext cx="5694015" cy="4094071"/>
           </a:xfrm>
         </p:spPr>
         <p:txBody>
           <a:bodyPr/>
           <a:lstStyle>
             <a:lvl1pPr>
-              <a:defRPr sz="1813"/>
+              <a:defRPr sz="2688"/>
             </a:lvl1pPr>
             <a:lvl2pPr>
-              <a:defRPr sz="1587"/>
+              <a:defRPr sz="2352"/>
             </a:lvl2pPr>
             <a:lvl3pPr>
-              <a:defRPr sz="1360"/>
+              <a:defRPr sz="2016"/>
             </a:lvl3pPr>
             <a:lvl4pPr>
-              <a:defRPr sz="1133"/>
+              <a:defRPr sz="1680"/>
             </a:lvl4pPr>
             <a:lvl5pPr>
-              <a:defRPr sz="1133"/>
+              <a:defRPr sz="1680"/>
             </a:lvl5pPr>
             <a:lvl6pPr>
-              <a:defRPr sz="1133"/>
+              <a:defRPr sz="1680"/>
             </a:lvl6pPr>
             <a:lvl7pPr>
-              <a:defRPr sz="1133"/>
+              <a:defRPr sz="1680"/>
             </a:lvl7pPr>
             <a:lvl8pPr>
-              <a:defRPr sz="1133"/>
+              <a:defRPr sz="1680"/>
             </a:lvl8pPr>
             <a:lvl9pPr>
-              <a:defRPr sz="1133"/>
+              <a:defRPr sz="1680"/>
             </a:lvl9pPr>
           </a:lstStyle>
           <a:p>
@@ -2028,8 +2028,8 @@
         </p:nvSpPr>
         <p:spPr>
           <a:xfrm>
-            <a:off x="787302" y="1165860"/>
-            <a:ext cx="3686472" cy="2159900"/>
+            <a:off x="774727" y="1728311"/>
+            <a:ext cx="3627591" cy="3201911"/>
           </a:xfrm>
         </p:spPr>
         <p:txBody>
@@ -2037,39 +2037,39 @@
           <a:lstStyle>
             <a:lvl1pPr marL="0" indent="0">
               <a:buNone/>
-              <a:defRPr sz="907"/>
+              <a:defRPr sz="1344"/>
             </a:lvl1pPr>
-            <a:lvl2pPr marL="259095" indent="0">
-              <a:buNone/>
-              <a:defRPr sz="793"/>
+            <a:lvl2pPr marL="384048" indent="0">
+              <a:buNone/>
+              <a:defRPr sz="1176"/>
             </a:lvl2pPr>
-            <a:lvl3pPr marL="518190" indent="0">
-              <a:buNone/>
-              <a:defRPr sz="680"/>
+            <a:lvl3pPr marL="768096" indent="0">
+              <a:buNone/>
+              <a:defRPr sz="1008"/>
             </a:lvl3pPr>
-            <a:lvl4pPr marL="777286" indent="0">
-              <a:buNone/>
-              <a:defRPr sz="567"/>
+            <a:lvl4pPr marL="1152144" indent="0">
+              <a:buNone/>
+              <a:defRPr sz="840"/>
             </a:lvl4pPr>
-            <a:lvl5pPr marL="1036381" indent="0">
-              <a:buNone/>
-              <a:defRPr sz="567"/>
+            <a:lvl5pPr marL="1536192" indent="0">
+              <a:buNone/>
+              <a:defRPr sz="840"/>
             </a:lvl5pPr>
-            <a:lvl6pPr marL="1295476" indent="0">
-              <a:buNone/>
-              <a:defRPr sz="567"/>
+            <a:lvl6pPr marL="1920240" indent="0">
+              <a:buNone/>
+              <a:defRPr sz="840"/>
             </a:lvl6pPr>
-            <a:lvl7pPr marL="1554571" indent="0">
-              <a:buNone/>
-              <a:defRPr sz="567"/>
+            <a:lvl7pPr marL="2304288" indent="0">
+              <a:buNone/>
+              <a:defRPr sz="840"/>
             </a:lvl7pPr>
-            <a:lvl8pPr marL="1813667" indent="0">
-              <a:buNone/>
-              <a:defRPr sz="567"/>
+            <a:lvl8pPr marL="2688336" indent="0">
+              <a:buNone/>
+              <a:defRPr sz="840"/>
             </a:lvl8pPr>
-            <a:lvl9pPr marL="2072762" indent="0">
-              <a:buNone/>
-              <a:defRPr sz="567"/>
+            <a:lvl9pPr marL="3072384" indent="0">
+              <a:buNone/>
+              <a:defRPr sz="840"/>
             </a:lvl9pPr>
           </a:lstStyle>
           <a:p>
@@ -2098,7 +2098,7 @@
           <a:p>
             <a:fld id="{CFC60B5F-2253-DF41-8690-61B53F1555CE}" type="datetimeFigureOut">
               <a:rPr lang="en-US" smtClean="0"/>
-              <a:t>2/5/24</a:t>
+              <a:t>2/17/24</a:t>
             </a:fld>
             <a:endParaRPr lang="en-US"/>
           </a:p>
@@ -2149,7 +2149,7 @@
     </p:spTree>
     <p:extLst>
       <p:ext uri="{BB962C8B-B14F-4D97-AF65-F5344CB8AC3E}">
-        <p14:creationId xmlns:p14="http://schemas.microsoft.com/office/powerpoint/2010/main" val="1761137248"/>
+        <p14:creationId xmlns:p14="http://schemas.microsoft.com/office/powerpoint/2010/main" val="462891216"/>
       </p:ext>
     </p:extLst>
   </p:cSld>
@@ -2188,15 +2188,15 @@
         </p:nvSpPr>
         <p:spPr>
           <a:xfrm>
-            <a:off x="787302" y="259080"/>
-            <a:ext cx="3686472" cy="906780"/>
+            <a:off x="774727" y="384069"/>
+            <a:ext cx="3627591" cy="1344242"/>
           </a:xfrm>
         </p:spPr>
         <p:txBody>
           <a:bodyPr anchor="b"/>
           <a:lstStyle>
             <a:lvl1pPr>
-              <a:defRPr sz="1813"/>
+              <a:defRPr sz="2688"/>
             </a:lvl1pPr>
           </a:lstStyle>
           <a:p>
@@ -2220,8 +2220,8 @@
         </p:nvSpPr>
         <p:spPr>
           <a:xfrm>
-            <a:off x="4859238" y="559541"/>
-            <a:ext cx="5786438" cy="2761721"/>
+            <a:off x="4781626" y="829483"/>
+            <a:ext cx="5694015" cy="4094071"/>
           </a:xfrm>
         </p:spPr>
         <p:txBody>
@@ -2229,39 +2229,39 @@
           <a:lstStyle>
             <a:lvl1pPr marL="0" indent="0">
               <a:buNone/>
-              <a:defRPr sz="1813"/>
+              <a:defRPr sz="2688"/>
             </a:lvl1pPr>
-            <a:lvl2pPr marL="259095" indent="0">
-              <a:buNone/>
-              <a:defRPr sz="1587"/>
+            <a:lvl2pPr marL="384048" indent="0">
+              <a:buNone/>
+              <a:defRPr sz="2352"/>
             </a:lvl2pPr>
-            <a:lvl3pPr marL="518190" indent="0">
-              <a:buNone/>
-              <a:defRPr sz="1360"/>
+            <a:lvl3pPr marL="768096" indent="0">
+              <a:buNone/>
+              <a:defRPr sz="2016"/>
             </a:lvl3pPr>
-            <a:lvl4pPr marL="777286" indent="0">
-              <a:buNone/>
-              <a:defRPr sz="1133"/>
+            <a:lvl4pPr marL="1152144" indent="0">
+              <a:buNone/>
+              <a:defRPr sz="1680"/>
             </a:lvl4pPr>
-            <a:lvl5pPr marL="1036381" indent="0">
-              <a:buNone/>
-              <a:defRPr sz="1133"/>
+            <a:lvl5pPr marL="1536192" indent="0">
+              <a:buNone/>
+              <a:defRPr sz="1680"/>
             </a:lvl5pPr>
-            <a:lvl6pPr marL="1295476" indent="0">
-              <a:buNone/>
-              <a:defRPr sz="1133"/>
+            <a:lvl6pPr marL="1920240" indent="0">
+              <a:buNone/>
+              <a:defRPr sz="1680"/>
             </a:lvl6pPr>
-            <a:lvl7pPr marL="1554571" indent="0">
-              <a:buNone/>
-              <a:defRPr sz="1133"/>
+            <a:lvl7pPr marL="2304288" indent="0">
+              <a:buNone/>
+              <a:defRPr sz="1680"/>
             </a:lvl7pPr>
-            <a:lvl8pPr marL="1813667" indent="0">
-              <a:buNone/>
-              <a:defRPr sz="1133"/>
+            <a:lvl8pPr marL="2688336" indent="0">
+              <a:buNone/>
+              <a:defRPr sz="1680"/>
             </a:lvl8pPr>
-            <a:lvl9pPr marL="2072762" indent="0">
-              <a:buNone/>
-              <a:defRPr sz="1133"/>
+            <a:lvl9pPr marL="3072384" indent="0">
+              <a:buNone/>
+              <a:defRPr sz="1680"/>
             </a:lvl9pPr>
           </a:lstStyle>
           <a:p>
@@ -2285,8 +2285,8 @@
         </p:nvSpPr>
         <p:spPr>
           <a:xfrm>
-            <a:off x="787302" y="1165860"/>
-            <a:ext cx="3686472" cy="2159900"/>
+            <a:off x="774727" y="1728311"/>
+            <a:ext cx="3627591" cy="3201911"/>
           </a:xfrm>
         </p:spPr>
         <p:txBody>
@@ -2294,39 +2294,39 @@
           <a:lstStyle>
             <a:lvl1pPr marL="0" indent="0">
               <a:buNone/>
-              <a:defRPr sz="907"/>
+              <a:defRPr sz="1344"/>
             </a:lvl1pPr>
-            <a:lvl2pPr marL="259095" indent="0">
-              <a:buNone/>
-              <a:defRPr sz="793"/>
+            <a:lvl2pPr marL="384048" indent="0">
+              <a:buNone/>
+              <a:defRPr sz="1176"/>
             </a:lvl2pPr>
-            <a:lvl3pPr marL="518190" indent="0">
-              <a:buNone/>
-              <a:defRPr sz="680"/>
+            <a:lvl3pPr marL="768096" indent="0">
+              <a:buNone/>
+              <a:defRPr sz="1008"/>
             </a:lvl3pPr>
-            <a:lvl4pPr marL="777286" indent="0">
-              <a:buNone/>
-              <a:defRPr sz="567"/>
+            <a:lvl4pPr marL="1152144" indent="0">
+              <a:buNone/>
+              <a:defRPr sz="840"/>
             </a:lvl4pPr>
-            <a:lvl5pPr marL="1036381" indent="0">
-              <a:buNone/>
-              <a:defRPr sz="567"/>
+            <a:lvl5pPr marL="1536192" indent="0">
+              <a:buNone/>
+              <a:defRPr sz="840"/>
             </a:lvl5pPr>
-            <a:lvl6pPr marL="1295476" indent="0">
-              <a:buNone/>
-              <a:defRPr sz="567"/>
+            <a:lvl6pPr marL="1920240" indent="0">
+              <a:buNone/>
+              <a:defRPr sz="840"/>
             </a:lvl6pPr>
-            <a:lvl7pPr marL="1554571" indent="0">
-              <a:buNone/>
-              <a:defRPr sz="567"/>
+            <a:lvl7pPr marL="2304288" indent="0">
+              <a:buNone/>
+              <a:defRPr sz="840"/>
             </a:lvl7pPr>
-            <a:lvl8pPr marL="1813667" indent="0">
-              <a:buNone/>
-              <a:defRPr sz="567"/>
+            <a:lvl8pPr marL="2688336" indent="0">
+              <a:buNone/>
+              <a:defRPr sz="840"/>
             </a:lvl8pPr>
-            <a:lvl9pPr marL="2072762" indent="0">
-              <a:buNone/>
-              <a:defRPr sz="567"/>
+            <a:lvl9pPr marL="3072384" indent="0">
+              <a:buNone/>
+              <a:defRPr sz="840"/>
             </a:lvl9pPr>
           </a:lstStyle>
           <a:p>
@@ -2355,7 +2355,7 @@
           <a:p>
             <a:fld id="{CFC60B5F-2253-DF41-8690-61B53F1555CE}" type="datetimeFigureOut">
               <a:rPr lang="en-US" smtClean="0"/>
-              <a:t>2/5/24</a:t>
+              <a:t>2/17/24</a:t>
             </a:fld>
             <a:endParaRPr lang="en-US"/>
           </a:p>
@@ -2406,7 +2406,7 @@
     </p:spTree>
     <p:extLst>
       <p:ext uri="{BB962C8B-B14F-4D97-AF65-F5344CB8AC3E}">
-        <p14:creationId xmlns:p14="http://schemas.microsoft.com/office/powerpoint/2010/main" val="874583533"/>
+        <p14:creationId xmlns:p14="http://schemas.microsoft.com/office/powerpoint/2010/main" val="3357912779"/>
       </p:ext>
     </p:extLst>
   </p:cSld>
@@ -2450,8 +2450,8 @@
         </p:nvSpPr>
         <p:spPr>
           <a:xfrm>
-            <a:off x="785813" y="206905"/>
-            <a:ext cx="9858375" cy="751152"/>
+            <a:off x="773262" y="306723"/>
+            <a:ext cx="9700915" cy="1113534"/>
           </a:xfrm>
           <a:prstGeom prst="rect">
             <a:avLst/>
@@ -2483,8 +2483,8 @@
         </p:nvSpPr>
         <p:spPr>
           <a:xfrm>
-            <a:off x="785813" y="1034521"/>
-            <a:ext cx="9858375" cy="2465758"/>
+            <a:off x="773262" y="1533609"/>
+            <a:ext cx="9700915" cy="3655326"/>
           </a:xfrm>
           <a:prstGeom prst="rect">
             <a:avLst/>
@@ -2545,8 +2545,8 @@
         </p:nvSpPr>
         <p:spPr>
           <a:xfrm>
-            <a:off x="785812" y="3601932"/>
-            <a:ext cx="2571750" cy="206904"/>
+            <a:off x="773261" y="5339629"/>
+            <a:ext cx="2530674" cy="306722"/>
           </a:xfrm>
           <a:prstGeom prst="rect">
             <a:avLst/>
@@ -2556,7 +2556,7 @@
           <a:bodyPr vert="horz" lIns="91440" tIns="45720" rIns="91440" bIns="45720" rtlCol="0" anchor="ctr"/>
           <a:lstStyle>
             <a:lvl1pPr algn="l">
-              <a:defRPr sz="680">
+              <a:defRPr sz="1008">
                 <a:solidFill>
                   <a:schemeClr val="tx1">
                     <a:tint val="75000"/>
@@ -2568,7 +2568,7 @@
           <a:p>
             <a:fld id="{CFC60B5F-2253-DF41-8690-61B53F1555CE}" type="datetimeFigureOut">
               <a:rPr lang="en-US" smtClean="0"/>
-              <a:t>2/5/24</a:t>
+              <a:t>2/17/24</a:t>
             </a:fld>
             <a:endParaRPr lang="en-US"/>
           </a:p>
@@ -2586,8 +2586,8 @@
         </p:nvSpPr>
         <p:spPr>
           <a:xfrm>
-            <a:off x="3786188" y="3601932"/>
-            <a:ext cx="3857625" cy="206904"/>
+            <a:off x="3725714" y="5339629"/>
+            <a:ext cx="3796010" cy="306722"/>
           </a:xfrm>
           <a:prstGeom prst="rect">
             <a:avLst/>
@@ -2597,7 +2597,7 @@
           <a:bodyPr vert="horz" lIns="91440" tIns="45720" rIns="91440" bIns="45720" rtlCol="0" anchor="ctr"/>
           <a:lstStyle>
             <a:lvl1pPr algn="ctr">
-              <a:defRPr sz="680">
+              <a:defRPr sz="1008">
                 <a:solidFill>
                   <a:schemeClr val="tx1">
                     <a:tint val="75000"/>
@@ -2623,8 +2623,8 @@
         </p:nvSpPr>
         <p:spPr>
           <a:xfrm>
-            <a:off x="8072438" y="3601932"/>
-            <a:ext cx="2571750" cy="206904"/>
+            <a:off x="7943503" y="5339629"/>
+            <a:ext cx="2530674" cy="306722"/>
           </a:xfrm>
           <a:prstGeom prst="rect">
             <a:avLst/>
@@ -2634,7 +2634,7 @@
           <a:bodyPr vert="horz" lIns="91440" tIns="45720" rIns="91440" bIns="45720" rtlCol="0" anchor="ctr"/>
           <a:lstStyle>
             <a:lvl1pPr algn="r">
-              <a:defRPr sz="680">
+              <a:defRPr sz="1008">
                 <a:solidFill>
                   <a:schemeClr val="tx1">
                     <a:tint val="75000"/>
@@ -2655,27 +2655,27 @@
     </p:spTree>
     <p:extLst>
       <p:ext uri="{BB962C8B-B14F-4D97-AF65-F5344CB8AC3E}">
-        <p14:creationId xmlns:p14="http://schemas.microsoft.com/office/powerpoint/2010/main" val="3755992787"/>
+        <p14:creationId xmlns:p14="http://schemas.microsoft.com/office/powerpoint/2010/main" val="1663628039"/>
       </p:ext>
     </p:extLst>
   </p:cSld>
   <p:clrMap bg1="lt1" tx1="dk1" bg2="lt2" tx2="dk2" accent1="accent1" accent2="accent2" accent3="accent3" accent4="accent4" accent5="accent5" accent6="accent6" hlink="hlink" folHlink="folHlink"/>
   <p:sldLayoutIdLst>
-    <p:sldLayoutId id="2147483709" r:id="rId1"/>
-    <p:sldLayoutId id="2147483710" r:id="rId2"/>
-    <p:sldLayoutId id="2147483711" r:id="rId3"/>
-    <p:sldLayoutId id="2147483712" r:id="rId4"/>
-    <p:sldLayoutId id="2147483713" r:id="rId5"/>
-    <p:sldLayoutId id="2147483714" r:id="rId6"/>
-    <p:sldLayoutId id="2147483715" r:id="rId7"/>
-    <p:sldLayoutId id="2147483716" r:id="rId8"/>
-    <p:sldLayoutId id="2147483717" r:id="rId9"/>
-    <p:sldLayoutId id="2147483718" r:id="rId10"/>
-    <p:sldLayoutId id="2147483719" r:id="rId11"/>
+    <p:sldLayoutId id="2147483745" r:id="rId1"/>
+    <p:sldLayoutId id="2147483746" r:id="rId2"/>
+    <p:sldLayoutId id="2147483747" r:id="rId3"/>
+    <p:sldLayoutId id="2147483748" r:id="rId4"/>
+    <p:sldLayoutId id="2147483749" r:id="rId5"/>
+    <p:sldLayoutId id="2147483750" r:id="rId6"/>
+    <p:sldLayoutId id="2147483751" r:id="rId7"/>
+    <p:sldLayoutId id="2147483752" r:id="rId8"/>
+    <p:sldLayoutId id="2147483753" r:id="rId9"/>
+    <p:sldLayoutId id="2147483754" r:id="rId10"/>
+    <p:sldLayoutId id="2147483755" r:id="rId11"/>
   </p:sldLayoutIdLst>
   <p:txStyles>
     <p:titleStyle>
-      <a:lvl1pPr algn="l" defTabSz="518190" rtl="0" eaLnBrk="1" latinLnBrk="0" hangingPunct="1">
+      <a:lvl1pPr algn="l" defTabSz="768096" rtl="0" eaLnBrk="1" latinLnBrk="0" hangingPunct="1">
         <a:lnSpc>
           <a:spcPct val="90000"/>
         </a:lnSpc>
@@ -2683,7 +2683,7 @@
           <a:spcPct val="0"/>
         </a:spcBef>
         <a:buNone/>
-        <a:defRPr sz="2493" kern="1200">
+        <a:defRPr sz="3696" kern="1200">
           <a:solidFill>
             <a:schemeClr val="tx1"/>
           </a:solidFill>
@@ -2694,16 +2694,16 @@
       </a:lvl1pPr>
     </p:titleStyle>
     <p:bodyStyle>
-      <a:lvl1pPr marL="129548" indent="-129548" algn="l" defTabSz="518190" rtl="0" eaLnBrk="1" latinLnBrk="0" hangingPunct="1">
+      <a:lvl1pPr marL="192024" indent="-192024" algn="l" defTabSz="768096" rtl="0" eaLnBrk="1" latinLnBrk="0" hangingPunct="1">
         <a:lnSpc>
           <a:spcPct val="90000"/>
         </a:lnSpc>
         <a:spcBef>
-          <a:spcPts val="567"/>
+          <a:spcPts val="840"/>
         </a:spcBef>
         <a:buFont typeface="Arial" panose="020B0604020202020204" pitchFamily="34" charset="0"/>
         <a:buChar char="•"/>
-        <a:defRPr sz="1587" kern="1200">
+        <a:defRPr sz="2352" kern="1200">
           <a:solidFill>
             <a:schemeClr val="tx1"/>
           </a:solidFill>
@@ -2712,16 +2712,16 @@
           <a:cs typeface="+mn-cs"/>
         </a:defRPr>
       </a:lvl1pPr>
-      <a:lvl2pPr marL="388643" indent="-129548" algn="l" defTabSz="518190" rtl="0" eaLnBrk="1" latinLnBrk="0" hangingPunct="1">
+      <a:lvl2pPr marL="576072" indent="-192024" algn="l" defTabSz="768096" rtl="0" eaLnBrk="1" latinLnBrk="0" hangingPunct="1">
         <a:lnSpc>
           <a:spcPct val="90000"/>
         </a:lnSpc>
         <a:spcBef>
-          <a:spcPts val="283"/>
+          <a:spcPts val="420"/>
         </a:spcBef>
         <a:buFont typeface="Arial" panose="020B0604020202020204" pitchFamily="34" charset="0"/>
         <a:buChar char="•"/>
-        <a:defRPr sz="1360" kern="1200">
+        <a:defRPr sz="2016" kern="1200">
           <a:solidFill>
             <a:schemeClr val="tx1"/>
           </a:solidFill>
@@ -2730,16 +2730,16 @@
           <a:cs typeface="+mn-cs"/>
         </a:defRPr>
       </a:lvl2pPr>
-      <a:lvl3pPr marL="647738" indent="-129548" algn="l" defTabSz="518190" rtl="0" eaLnBrk="1" latinLnBrk="0" hangingPunct="1">
+      <a:lvl3pPr marL="960120" indent="-192024" algn="l" defTabSz="768096" rtl="0" eaLnBrk="1" latinLnBrk="0" hangingPunct="1">
         <a:lnSpc>
           <a:spcPct val="90000"/>
         </a:lnSpc>
         <a:spcBef>
-          <a:spcPts val="283"/>
+          <a:spcPts val="420"/>
         </a:spcBef>
         <a:buFont typeface="Arial" panose="020B0604020202020204" pitchFamily="34" charset="0"/>
         <a:buChar char="•"/>
-        <a:defRPr sz="1133" kern="1200">
+        <a:defRPr sz="1680" kern="1200">
           <a:solidFill>
             <a:schemeClr val="tx1"/>
           </a:solidFill>
@@ -2748,16 +2748,16 @@
           <a:cs typeface="+mn-cs"/>
         </a:defRPr>
       </a:lvl3pPr>
-      <a:lvl4pPr marL="906833" indent="-129548" algn="l" defTabSz="518190" rtl="0" eaLnBrk="1" latinLnBrk="0" hangingPunct="1">
+      <a:lvl4pPr marL="1344168" indent="-192024" algn="l" defTabSz="768096" rtl="0" eaLnBrk="1" latinLnBrk="0" hangingPunct="1">
         <a:lnSpc>
           <a:spcPct val="90000"/>
         </a:lnSpc>
         <a:spcBef>
-          <a:spcPts val="283"/>
+          <a:spcPts val="420"/>
         </a:spcBef>
         <a:buFont typeface="Arial" panose="020B0604020202020204" pitchFamily="34" charset="0"/>
         <a:buChar char="•"/>
-        <a:defRPr sz="1020" kern="1200">
+        <a:defRPr sz="1512" kern="1200">
           <a:solidFill>
             <a:schemeClr val="tx1"/>
           </a:solidFill>
@@ -2766,16 +2766,16 @@
           <a:cs typeface="+mn-cs"/>
         </a:defRPr>
       </a:lvl4pPr>
-      <a:lvl5pPr marL="1165929" indent="-129548" algn="l" defTabSz="518190" rtl="0" eaLnBrk="1" latinLnBrk="0" hangingPunct="1">
+      <a:lvl5pPr marL="1728216" indent="-192024" algn="l" defTabSz="768096" rtl="0" eaLnBrk="1" latinLnBrk="0" hangingPunct="1">
         <a:lnSpc>
           <a:spcPct val="90000"/>
         </a:lnSpc>
         <a:spcBef>
-          <a:spcPts val="283"/>
+          <a:spcPts val="420"/>
         </a:spcBef>
         <a:buFont typeface="Arial" panose="020B0604020202020204" pitchFamily="34" charset="0"/>
         <a:buChar char="•"/>
-        <a:defRPr sz="1020" kern="1200">
+        <a:defRPr sz="1512" kern="1200">
           <a:solidFill>
             <a:schemeClr val="tx1"/>
           </a:solidFill>
@@ -2784,16 +2784,16 @@
           <a:cs typeface="+mn-cs"/>
         </a:defRPr>
       </a:lvl5pPr>
-      <a:lvl6pPr marL="1425024" indent="-129548" algn="l" defTabSz="518190" rtl="0" eaLnBrk="1" latinLnBrk="0" hangingPunct="1">
+      <a:lvl6pPr marL="2112264" indent="-192024" algn="l" defTabSz="768096" rtl="0" eaLnBrk="1" latinLnBrk="0" hangingPunct="1">
         <a:lnSpc>
           <a:spcPct val="90000"/>
         </a:lnSpc>
         <a:spcBef>
-          <a:spcPts val="283"/>
+          <a:spcPts val="420"/>
         </a:spcBef>
         <a:buFont typeface="Arial" panose="020B0604020202020204" pitchFamily="34" charset="0"/>
         <a:buChar char="•"/>
-        <a:defRPr sz="1020" kern="1200">
+        <a:defRPr sz="1512" kern="1200">
           <a:solidFill>
             <a:schemeClr val="tx1"/>
           </a:solidFill>
@@ -2802,16 +2802,16 @@
           <a:cs typeface="+mn-cs"/>
         </a:defRPr>
       </a:lvl6pPr>
-      <a:lvl7pPr marL="1684119" indent="-129548" algn="l" defTabSz="518190" rtl="0" eaLnBrk="1" latinLnBrk="0" hangingPunct="1">
+      <a:lvl7pPr marL="2496312" indent="-192024" algn="l" defTabSz="768096" rtl="0" eaLnBrk="1" latinLnBrk="0" hangingPunct="1">
         <a:lnSpc>
           <a:spcPct val="90000"/>
         </a:lnSpc>
         <a:spcBef>
-          <a:spcPts val="283"/>
+          <a:spcPts val="420"/>
         </a:spcBef>
         <a:buFont typeface="Arial" panose="020B0604020202020204" pitchFamily="34" charset="0"/>
         <a:buChar char="•"/>
-        <a:defRPr sz="1020" kern="1200">
+        <a:defRPr sz="1512" kern="1200">
           <a:solidFill>
             <a:schemeClr val="tx1"/>
           </a:solidFill>
@@ -2820,16 +2820,16 @@
           <a:cs typeface="+mn-cs"/>
         </a:defRPr>
       </a:lvl7pPr>
-      <a:lvl8pPr marL="1943214" indent="-129548" algn="l" defTabSz="518190" rtl="0" eaLnBrk="1" latinLnBrk="0" hangingPunct="1">
+      <a:lvl8pPr marL="2880360" indent="-192024" algn="l" defTabSz="768096" rtl="0" eaLnBrk="1" latinLnBrk="0" hangingPunct="1">
         <a:lnSpc>
           <a:spcPct val="90000"/>
         </a:lnSpc>
         <a:spcBef>
-          <a:spcPts val="283"/>
+          <a:spcPts val="420"/>
         </a:spcBef>
         <a:buFont typeface="Arial" panose="020B0604020202020204" pitchFamily="34" charset="0"/>
         <a:buChar char="•"/>
-        <a:defRPr sz="1020" kern="1200">
+        <a:defRPr sz="1512" kern="1200">
           <a:solidFill>
             <a:schemeClr val="tx1"/>
           </a:solidFill>
@@ -2838,16 +2838,16 @@
           <a:cs typeface="+mn-cs"/>
         </a:defRPr>
       </a:lvl8pPr>
-      <a:lvl9pPr marL="2202310" indent="-129548" algn="l" defTabSz="518190" rtl="0" eaLnBrk="1" latinLnBrk="0" hangingPunct="1">
+      <a:lvl9pPr marL="3264408" indent="-192024" algn="l" defTabSz="768096" rtl="0" eaLnBrk="1" latinLnBrk="0" hangingPunct="1">
         <a:lnSpc>
           <a:spcPct val="90000"/>
         </a:lnSpc>
         <a:spcBef>
-          <a:spcPts val="283"/>
+          <a:spcPts val="420"/>
         </a:spcBef>
         <a:buFont typeface="Arial" panose="020B0604020202020204" pitchFamily="34" charset="0"/>
         <a:buChar char="•"/>
-        <a:defRPr sz="1020" kern="1200">
+        <a:defRPr sz="1512" kern="1200">
           <a:solidFill>
             <a:schemeClr val="tx1"/>
           </a:solidFill>
@@ -2861,8 +2861,8 @@
       <a:defPPr>
         <a:defRPr lang="en-US"/>
       </a:defPPr>
-      <a:lvl1pPr marL="0" algn="l" defTabSz="518190" rtl="0" eaLnBrk="1" latinLnBrk="0" hangingPunct="1">
-        <a:defRPr sz="1020" kern="1200">
+      <a:lvl1pPr marL="0" algn="l" defTabSz="768096" rtl="0" eaLnBrk="1" latinLnBrk="0" hangingPunct="1">
+        <a:defRPr sz="1512" kern="1200">
           <a:solidFill>
             <a:schemeClr val="tx1"/>
           </a:solidFill>
@@ -2871,8 +2871,8 @@
           <a:cs typeface="+mn-cs"/>
         </a:defRPr>
       </a:lvl1pPr>
-      <a:lvl2pPr marL="259095" algn="l" defTabSz="518190" rtl="0" eaLnBrk="1" latinLnBrk="0" hangingPunct="1">
-        <a:defRPr sz="1020" kern="1200">
+      <a:lvl2pPr marL="384048" algn="l" defTabSz="768096" rtl="0" eaLnBrk="1" latinLnBrk="0" hangingPunct="1">
+        <a:defRPr sz="1512" kern="1200">
           <a:solidFill>
             <a:schemeClr val="tx1"/>
           </a:solidFill>
@@ -2881,8 +2881,8 @@
           <a:cs typeface="+mn-cs"/>
         </a:defRPr>
       </a:lvl2pPr>
-      <a:lvl3pPr marL="518190" algn="l" defTabSz="518190" rtl="0" eaLnBrk="1" latinLnBrk="0" hangingPunct="1">
-        <a:defRPr sz="1020" kern="1200">
+      <a:lvl3pPr marL="768096" algn="l" defTabSz="768096" rtl="0" eaLnBrk="1" latinLnBrk="0" hangingPunct="1">
+        <a:defRPr sz="1512" kern="1200">
           <a:solidFill>
             <a:schemeClr val="tx1"/>
           </a:solidFill>
@@ -2891,8 +2891,8 @@
           <a:cs typeface="+mn-cs"/>
         </a:defRPr>
       </a:lvl3pPr>
-      <a:lvl4pPr marL="777286" algn="l" defTabSz="518190" rtl="0" eaLnBrk="1" latinLnBrk="0" hangingPunct="1">
-        <a:defRPr sz="1020" kern="1200">
+      <a:lvl4pPr marL="1152144" algn="l" defTabSz="768096" rtl="0" eaLnBrk="1" latinLnBrk="0" hangingPunct="1">
+        <a:defRPr sz="1512" kern="1200">
           <a:solidFill>
             <a:schemeClr val="tx1"/>
           </a:solidFill>
@@ -2901,8 +2901,8 @@
           <a:cs typeface="+mn-cs"/>
         </a:defRPr>
       </a:lvl4pPr>
-      <a:lvl5pPr marL="1036381" algn="l" defTabSz="518190" rtl="0" eaLnBrk="1" latinLnBrk="0" hangingPunct="1">
-        <a:defRPr sz="1020" kern="1200">
+      <a:lvl5pPr marL="1536192" algn="l" defTabSz="768096" rtl="0" eaLnBrk="1" latinLnBrk="0" hangingPunct="1">
+        <a:defRPr sz="1512" kern="1200">
           <a:solidFill>
             <a:schemeClr val="tx1"/>
           </a:solidFill>
@@ -2911,8 +2911,8 @@
           <a:cs typeface="+mn-cs"/>
         </a:defRPr>
       </a:lvl5pPr>
-      <a:lvl6pPr marL="1295476" algn="l" defTabSz="518190" rtl="0" eaLnBrk="1" latinLnBrk="0" hangingPunct="1">
-        <a:defRPr sz="1020" kern="1200">
+      <a:lvl6pPr marL="1920240" algn="l" defTabSz="768096" rtl="0" eaLnBrk="1" latinLnBrk="0" hangingPunct="1">
+        <a:defRPr sz="1512" kern="1200">
           <a:solidFill>
             <a:schemeClr val="tx1"/>
           </a:solidFill>
@@ -2921,8 +2921,8 @@
           <a:cs typeface="+mn-cs"/>
         </a:defRPr>
       </a:lvl6pPr>
-      <a:lvl7pPr marL="1554571" algn="l" defTabSz="518190" rtl="0" eaLnBrk="1" latinLnBrk="0" hangingPunct="1">
-        <a:defRPr sz="1020" kern="1200">
+      <a:lvl7pPr marL="2304288" algn="l" defTabSz="768096" rtl="0" eaLnBrk="1" latinLnBrk="0" hangingPunct="1">
+        <a:defRPr sz="1512" kern="1200">
           <a:solidFill>
             <a:schemeClr val="tx1"/>
           </a:solidFill>
@@ -2931,8 +2931,8 @@
           <a:cs typeface="+mn-cs"/>
         </a:defRPr>
       </a:lvl7pPr>
-      <a:lvl8pPr marL="1813667" algn="l" defTabSz="518190" rtl="0" eaLnBrk="1" latinLnBrk="0" hangingPunct="1">
-        <a:defRPr sz="1020" kern="1200">
+      <a:lvl8pPr marL="2688336" algn="l" defTabSz="768096" rtl="0" eaLnBrk="1" latinLnBrk="0" hangingPunct="1">
+        <a:defRPr sz="1512" kern="1200">
           <a:solidFill>
             <a:schemeClr val="tx1"/>
           </a:solidFill>
@@ -2941,8 +2941,8 @@
           <a:cs typeface="+mn-cs"/>
         </a:defRPr>
       </a:lvl8pPr>
-      <a:lvl9pPr marL="2072762" algn="l" defTabSz="518190" rtl="0" eaLnBrk="1" latinLnBrk="0" hangingPunct="1">
-        <a:defRPr sz="1020" kern="1200">
+      <a:lvl9pPr marL="3072384" algn="l" defTabSz="768096" rtl="0" eaLnBrk="1" latinLnBrk="0" hangingPunct="1">
+        <a:defRPr sz="1512" kern="1200">
           <a:solidFill>
             <a:schemeClr val="tx1"/>
           </a:solidFill>
@@ -2973,12 +2973,98 @@
           <a:chExt cx="0" cy="0"/>
         </a:xfrm>
       </p:grpSpPr>
+      <p:sp>
+        <p:nvSpPr>
+          <p:cNvPr id="13" name="TextBox 12">
+            <a:extLst>
+              <a:ext uri="{FF2B5EF4-FFF2-40B4-BE49-F238E27FC236}">
+                <a16:creationId xmlns:a16="http://schemas.microsoft.com/office/drawing/2014/main" id="{DAE2B55C-3972-9839-069A-2AF190528614}"/>
+              </a:ext>
+            </a:extLst>
+          </p:cNvPr>
+          <p:cNvSpPr txBox="1"/>
+          <p:nvPr/>
+        </p:nvSpPr>
+        <p:spPr>
+          <a:xfrm>
+            <a:off x="676275" y="39388"/>
+            <a:ext cx="4552950" cy="303925"/>
+          </a:xfrm>
+          <a:prstGeom prst="rect">
+            <a:avLst/>
+          </a:prstGeom>
+          <a:noFill/>
+        </p:spPr>
+        <p:txBody>
+          <a:bodyPr wrap="square" rtlCol="0">
+            <a:spAutoFit/>
+          </a:bodyPr>
+          <a:lstStyle/>
+          <a:p>
+            <a:pPr algn="ctr"/>
+            <a:r>
+              <a:rPr lang="en-US" sz="1383" dirty="0" err="1">
+                <a:latin typeface=""/>
+                <a:cs typeface="Sabon Next LT" panose="02000500000000000000" pitchFamily="2" charset="0"/>
+              </a:rPr>
+              <a:t>cbAddDDM</a:t>
+            </a:r>
+            <a:endParaRPr lang="en-US" sz="1383" dirty="0">
+              <a:latin typeface=""/>
+              <a:cs typeface="Sabon Next LT" panose="02000500000000000000" pitchFamily="2" charset="0"/>
+            </a:endParaRPr>
+          </a:p>
+        </p:txBody>
+      </p:sp>
+      <p:sp>
+        <p:nvSpPr>
+          <p:cNvPr id="14" name="TextBox 13">
+            <a:extLst>
+              <a:ext uri="{FF2B5EF4-FFF2-40B4-BE49-F238E27FC236}">
+                <a16:creationId xmlns:a16="http://schemas.microsoft.com/office/drawing/2014/main" id="{E808C0C6-0D2B-2AF1-44DB-5CB023155B74}"/>
+              </a:ext>
+            </a:extLst>
+          </p:cNvPr>
+          <p:cNvSpPr txBox="1"/>
+          <p:nvPr/>
+        </p:nvSpPr>
+        <p:spPr>
+          <a:xfrm>
+            <a:off x="6488496" y="39388"/>
+            <a:ext cx="4552950" cy="303925"/>
+          </a:xfrm>
+          <a:prstGeom prst="rect">
+            <a:avLst/>
+          </a:prstGeom>
+          <a:noFill/>
+        </p:spPr>
+        <p:txBody>
+          <a:bodyPr wrap="square" rtlCol="0">
+            <a:spAutoFit/>
+          </a:bodyPr>
+          <a:lstStyle/>
+          <a:p>
+            <a:pPr algn="ctr"/>
+            <a:r>
+              <a:rPr lang="en-US" sz="1383" dirty="0" err="1">
+                <a:latin typeface=""/>
+                <a:cs typeface="Sabon Next LT" panose="02000500000000000000" pitchFamily="2" charset="0"/>
+              </a:rPr>
+              <a:t>cbGDaDDM</a:t>
+            </a:r>
+            <a:endParaRPr lang="en-US" sz="1383" dirty="0">
+              <a:latin typeface=""/>
+              <a:cs typeface="Sabon Next LT" panose="02000500000000000000" pitchFamily="2" charset="0"/>
+            </a:endParaRPr>
+          </a:p>
+        </p:txBody>
+      </p:sp>
       <p:pic>
         <p:nvPicPr>
-          <p:cNvPr id="4" name="Picture 3">
+          <p:cNvPr id="3" name="Picture 2">
             <a:extLst>
               <a:ext uri="{FF2B5EF4-FFF2-40B4-BE49-F238E27FC236}">
-                <a16:creationId xmlns:a16="http://schemas.microsoft.com/office/drawing/2014/main" id="{EECF4ABF-30A7-91C1-2128-DFC5B4AB1930}"/>
+                <a16:creationId xmlns:a16="http://schemas.microsoft.com/office/drawing/2014/main" id="{EA583864-1E79-A1AB-CCD3-559A92146B41}"/>
               </a:ext>
             </a:extLst>
           </p:cNvPr>
@@ -2995,106 +3081,20 @@
         </p:blipFill>
         <p:spPr>
           <a:xfrm>
-            <a:off x="1" y="236301"/>
-            <a:ext cx="5486400" cy="3649899"/>
+            <a:off x="0" y="343312"/>
+            <a:ext cx="5417727" cy="5417727"/>
           </a:xfrm>
           <a:prstGeom prst="rect">
             <a:avLst/>
           </a:prstGeom>
         </p:spPr>
       </p:pic>
-      <p:sp>
-        <p:nvSpPr>
-          <p:cNvPr id="13" name="TextBox 12">
+      <p:pic>
+        <p:nvPicPr>
+          <p:cNvPr id="6" name="Picture 5">
             <a:extLst>
               <a:ext uri="{FF2B5EF4-FFF2-40B4-BE49-F238E27FC236}">
-                <a16:creationId xmlns:a16="http://schemas.microsoft.com/office/drawing/2014/main" id="{DAE2B55C-3972-9839-069A-2AF190528614}"/>
-              </a:ext>
-            </a:extLst>
-          </p:cNvPr>
-          <p:cNvSpPr txBox="1"/>
-          <p:nvPr/>
-        </p:nvSpPr>
-        <p:spPr>
-          <a:xfrm>
-            <a:off x="0" y="1"/>
-            <a:ext cx="5486400" cy="307777"/>
-          </a:xfrm>
-          <a:prstGeom prst="rect">
-            <a:avLst/>
-          </a:prstGeom>
-          <a:noFill/>
-        </p:spPr>
-        <p:txBody>
-          <a:bodyPr wrap="square" rtlCol="0">
-            <a:spAutoFit/>
-          </a:bodyPr>
-          <a:lstStyle/>
-          <a:p>
-            <a:pPr algn="ctr"/>
-            <a:r>
-              <a:rPr lang="en-US" sz="1400" dirty="0" err="1">
-                <a:latin typeface=""/>
-                <a:cs typeface="Sabon Next LT" panose="02000500000000000000" pitchFamily="2" charset="0"/>
-              </a:rPr>
-              <a:t>AddDDM</a:t>
-            </a:r>
-            <a:endParaRPr lang="en-US" sz="1400" dirty="0">
-              <a:latin typeface=""/>
-              <a:cs typeface="Sabon Next LT" panose="02000500000000000000" pitchFamily="2" charset="0"/>
-            </a:endParaRPr>
-          </a:p>
-        </p:txBody>
-      </p:sp>
-      <p:sp>
-        <p:nvSpPr>
-          <p:cNvPr id="14" name="TextBox 13">
-            <a:extLst>
-              <a:ext uri="{FF2B5EF4-FFF2-40B4-BE49-F238E27FC236}">
-                <a16:creationId xmlns:a16="http://schemas.microsoft.com/office/drawing/2014/main" id="{E808C0C6-0D2B-2AF1-44DB-5CB023155B74}"/>
-              </a:ext>
-            </a:extLst>
-          </p:cNvPr>
-          <p:cNvSpPr txBox="1"/>
-          <p:nvPr/>
-        </p:nvSpPr>
-        <p:spPr>
-          <a:xfrm>
-            <a:off x="5943599" y="0"/>
-            <a:ext cx="5486400" cy="307777"/>
-          </a:xfrm>
-          <a:prstGeom prst="rect">
-            <a:avLst/>
-          </a:prstGeom>
-          <a:noFill/>
-        </p:spPr>
-        <p:txBody>
-          <a:bodyPr wrap="square" rtlCol="0">
-            <a:spAutoFit/>
-          </a:bodyPr>
-          <a:lstStyle/>
-          <a:p>
-            <a:pPr algn="ctr"/>
-            <a:r>
-              <a:rPr lang="en-US" sz="1400" dirty="0" err="1">
-                <a:latin typeface=""/>
-                <a:cs typeface="Sabon Next LT" panose="02000500000000000000" pitchFamily="2" charset="0"/>
-              </a:rPr>
-              <a:t>GDaDDM</a:t>
-            </a:r>
-            <a:endParaRPr lang="en-US" sz="1400" dirty="0">
-              <a:latin typeface=""/>
-              <a:cs typeface="Sabon Next LT" panose="02000500000000000000" pitchFamily="2" charset="0"/>
-            </a:endParaRPr>
-          </a:p>
-        </p:txBody>
-      </p:sp>
-      <p:pic>
-        <p:nvPicPr>
-          <p:cNvPr id="16" name="Picture 15">
-            <a:extLst>
-              <a:ext uri="{FF2B5EF4-FFF2-40B4-BE49-F238E27FC236}">
-                <a16:creationId xmlns:a16="http://schemas.microsoft.com/office/drawing/2014/main" id="{91673904-F6F3-6847-E888-2235930BC245}"/>
+                <a16:creationId xmlns:a16="http://schemas.microsoft.com/office/drawing/2014/main" id="{2779DA44-4498-6951-5CA6-30353D9E8EDA}"/>
               </a:ext>
             </a:extLst>
           </p:cNvPr>
@@ -3111,8 +3111,8 @@
         </p:blipFill>
         <p:spPr>
           <a:xfrm>
-            <a:off x="5943600" y="236301"/>
-            <a:ext cx="5486400" cy="3649900"/>
+            <a:off x="5829711" y="343312"/>
+            <a:ext cx="5417727" cy="5417727"/>
           </a:xfrm>
           <a:prstGeom prst="rect">
             <a:avLst/>

</xml_diff>